<commit_message>
Signed-off-by: Rakesh Kumar <rakesh.kumar@informatik.hs-fulda.de>
</commit_message>
<xml_diff>
--- a/BackEndPPT-Demo_V1.pptx
+++ b/BackEndPPT-Demo_V1.pptx
@@ -4705,6 +4705,14 @@
   <p:clrMapOvr>
     <a:masterClrMapping/>
   </p:clrMapOvr>
+  <mc:AlternateContent xmlns:mc="http://schemas.openxmlformats.org/markup-compatibility/2006">
+    <mc:Choice xmlns:p14="http://schemas.microsoft.com/office/powerpoint/2010/main" Requires="p14">
+      <p:transition spd="slow" p14:dur="2000" advTm="16756"/>
+    </mc:Choice>
+    <mc:Fallback>
+      <p:transition spd="slow" advTm="16756"/>
+    </mc:Fallback>
+  </mc:AlternateContent>
 </p:sld>
 </file>
 
@@ -4938,11 +4946,26 @@
                 </a:solidFill>
                 <a:latin typeface="Calibri" panose="020F0502020204030204" pitchFamily="34" charset="0"/>
               </a:rPr>
-              <a:t>) and start with the app.js to edit</a:t>
-            </a:r>
-          </a:p>
-          <a:p>
-            <a:pPr marL="342900" indent="-342900">
+              <a:t>) and start with the App.js to edit</a:t>
+            </a:r>
+          </a:p>
+          <a:p>
+            <a:pPr marL="342900" indent="-342900" algn="l">
+              <a:buFont typeface="+mj-lt"/>
+              <a:buAutoNum type="arabicPeriod"/>
+            </a:pPr>
+            <a:r>
+              <a:rPr lang="en-GB" sz="1400" dirty="0">
+                <a:solidFill>
+                  <a:srgbClr val="000000"/>
+                </a:solidFill>
+                <a:latin typeface="Calibri" panose="020F0502020204030204" pitchFamily="34" charset="0"/>
+              </a:rPr>
+              <a:t>Write code to create web server, include middleware for body-parser and custom routes in App.js.</a:t>
+            </a:r>
+          </a:p>
+          <a:p>
+            <a:pPr marL="342900" indent="-342900" algn="l">
               <a:buFont typeface="+mj-lt"/>
               <a:buAutoNum type="arabicPeriod"/>
             </a:pPr>
@@ -4953,7 +4976,31 @@
                 </a:solidFill>
                 <a:latin typeface="Calibri" panose="020F0502020204030204" pitchFamily="34" charset="0"/>
               </a:rPr>
-              <a:t>start the webserver via node.js using </a:t>
+              <a:t>Write code to user-routes.js to add API endpoints for PUT, GET, PATCH and DELETE.</a:t>
+            </a:r>
+          </a:p>
+          <a:p>
+            <a:pPr marL="342900" indent="-342900">
+              <a:buFont typeface="+mj-lt"/>
+              <a:buAutoNum type="arabicPeriod"/>
+            </a:pPr>
+            <a:r>
+              <a:rPr lang="en-GB" sz="1400" dirty="0">
+                <a:solidFill>
+                  <a:srgbClr val="000000"/>
+                </a:solidFill>
+                <a:latin typeface="Calibri" panose="020F0502020204030204" pitchFamily="34" charset="0"/>
+              </a:rPr>
+              <a:t>start the webserver </a:t>
+            </a:r>
+            <a:r>
+              <a:rPr lang="en-GB" sz="1400" b="0" i="0" u="none" strike="noStrike" baseline="0" dirty="0">
+                <a:solidFill>
+                  <a:srgbClr val="000000"/>
+                </a:solidFill>
+                <a:latin typeface="Calibri" panose="020F0502020204030204" pitchFamily="34" charset="0"/>
+              </a:rPr>
+              <a:t>via node.js using </a:t>
             </a:r>
             <a:r>
               <a:rPr lang="en-GB" sz="1400" b="0" i="0" u="none" strike="noStrike" baseline="0" dirty="0" err="1">
@@ -4962,20 +5009,8 @@
                 </a:solidFill>
                 <a:latin typeface="Calibri" panose="020F0502020204030204" pitchFamily="34" charset="0"/>
               </a:rPr>
-              <a:t>nodemon</a:t>
-            </a:r>
-            <a:endParaRPr lang="en-GB" sz="1400" b="0" i="0" u="none" strike="noStrike" baseline="0" dirty="0">
-              <a:solidFill>
-                <a:srgbClr val="000000"/>
-              </a:solidFill>
-              <a:latin typeface="Calibri" panose="020F0502020204030204" pitchFamily="34" charset="0"/>
-            </a:endParaRPr>
-          </a:p>
-          <a:p>
-            <a:pPr marL="342900" indent="-342900" algn="l">
-              <a:buFont typeface="+mj-lt"/>
-              <a:buAutoNum type="arabicPeriod"/>
-            </a:pPr>
+              <a:t>npm</a:t>
+            </a:r>
             <a:r>
               <a:rPr lang="en-GB" sz="1400" b="0" i="0" u="none" strike="noStrike" baseline="0" dirty="0">
                 <a:solidFill>
@@ -4983,7 +5018,7 @@
                 </a:solidFill>
                 <a:latin typeface="Calibri" panose="020F0502020204030204" pitchFamily="34" charset="0"/>
               </a:rPr>
-              <a:t>check API functionality</a:t>
+              <a:t> start</a:t>
             </a:r>
           </a:p>
           <a:p>
@@ -4998,7 +5033,7 @@
                 </a:solidFill>
                 <a:latin typeface="Calibri" panose="020F0502020204030204" pitchFamily="34" charset="0"/>
               </a:rPr>
-              <a:t>Test the API developed using tools like Postman or Insomnia.</a:t>
+              <a:t>check API functionality using tools like Postman or Insomnia.</a:t>
             </a:r>
             <a:endParaRPr lang="en-US" sz="1400" dirty="0"/>
           </a:p>

</xml_diff>

<commit_message>
Password Encrypted with bcryptjs Token generated using jasonwebtoken With above two authentication middleware added for each route except two.
Signed-off-by: Rakesh Kumar <rakesh.kumar@informatik.hs-fulda.de>
</commit_message>
<xml_diff>
--- a/BackEndPPT-Demo_V1.pptx
+++ b/BackEndPPT-Demo_V1.pptx
@@ -6,11 +6,13 @@
     <p:sldMasterId id="2147483690" r:id="rId2"/>
   </p:sldMasterIdLst>
   <p:notesMasterIdLst>
-    <p:notesMasterId r:id="rId5"/>
+    <p:notesMasterId r:id="rId7"/>
   </p:notesMasterIdLst>
   <p:sldIdLst>
-    <p:sldId id="266" r:id="rId3"/>
-    <p:sldId id="268" r:id="rId4"/>
+    <p:sldId id="268" r:id="rId3"/>
+    <p:sldId id="271" r:id="rId4"/>
+    <p:sldId id="269" r:id="rId5"/>
+    <p:sldId id="270" r:id="rId6"/>
   </p:sldIdLst>
   <p:sldSz cx="9144000" cy="5143500" type="screen16x9"/>
   <p:notesSz cx="6858000" cy="9144000"/>
@@ -143,13 +145,14 @@
     <p:ext uri="{521415D9-36F7-43E2-AB2F-B90AF26B5E84}">
       <p14:sectionLst xmlns:p14="http://schemas.microsoft.com/office/powerpoint/2010/main">
         <p14:section name="Default Section" id="{56D3B7EC-B5E5-44A1-87F2-79C32BA9BDA4}">
-          <p14:sldIdLst>
-            <p14:sldId id="266"/>
-          </p14:sldIdLst>
+          <p14:sldIdLst/>
         </p14:section>
         <p14:section name="Untitled Section" id="{569045B7-AAA9-4A95-B681-AC3CCDC7BFEE}">
           <p14:sldIdLst>
             <p14:sldId id="268"/>
+            <p14:sldId id="271"/>
+            <p14:sldId id="269"/>
+            <p14:sldId id="270"/>
           </p14:sldIdLst>
         </p14:section>
       </p14:sectionLst>
@@ -257,7 +260,7 @@
           <a:p>
             <a:fld id="{AC9B5B40-187D-4F94-8EF9-FABAEBB97EC2}" type="datetimeFigureOut">
               <a:rPr lang="de-DE" smtClean="0"/>
-              <a:t>04.11.2021</a:t>
+              <a:t>07.11.2021</a:t>
             </a:fld>
             <a:endParaRPr lang="de-DE"/>
           </a:p>
@@ -714,7 +717,7 @@
             </a:pPr>
             <a:fld id="{518CBB1A-5038-435A-BA47-A0E4DEB74A53}" type="datetime1">
               <a:rPr lang="de-DE" smtClean="0"/>
-              <a:t>04.11.2021</a:t>
+              <a:t>07.11.2021</a:t>
             </a:fld>
             <a:endParaRPr lang="de-DE" dirty="0"/>
           </a:p>
@@ -1105,7 +1108,7 @@
             </a:pPr>
             <a:fld id="{B838FA9D-6F75-4C66-9742-B0A152ADBF08}" type="datetime1">
               <a:rPr lang="de-DE" smtClean="0"/>
-              <a:t>04.11.2021</a:t>
+              <a:t>07.11.2021</a:t>
             </a:fld>
             <a:endParaRPr lang="de-DE"/>
           </a:p>
@@ -1247,7 +1250,7 @@
             </a:pPr>
             <a:fld id="{94A025F2-55A2-4636-B04D-A694AA4C3543}" type="datetime1">
               <a:rPr lang="de-DE" smtClean="0"/>
-              <a:t>04.11.2021</a:t>
+              <a:t>07.11.2021</a:t>
             </a:fld>
             <a:endParaRPr lang="de-DE"/>
           </a:p>
@@ -1340,7 +1343,7 @@
             </a:pPr>
             <a:fld id="{40339DCA-C8AC-4A68-83C7-F61D7A410829}" type="datetime1">
               <a:rPr lang="de-DE" smtClean="0"/>
-              <a:t>04.11.2021</a:t>
+              <a:t>07.11.2021</a:t>
             </a:fld>
             <a:endParaRPr lang="de-DE"/>
           </a:p>
@@ -1506,7 +1509,7 @@
             </a:pPr>
             <a:fld id="{124D5F09-0BA7-4AA3-ADBF-1890810E9EAF}" type="datetime1">
               <a:rPr lang="de-DE" smtClean="0"/>
-              <a:t>04.11.2021</a:t>
+              <a:t>07.11.2021</a:t>
             </a:fld>
             <a:endParaRPr lang="de-DE" dirty="0"/>
           </a:p>
@@ -1789,7 +1792,7 @@
             </a:pPr>
             <a:fld id="{84B0FAA9-2A18-4748-B214-AAB90B51B109}" type="datetime1">
               <a:rPr lang="de-DE" smtClean="0"/>
-              <a:t>04.11.2021</a:t>
+              <a:t>07.11.2021</a:t>
             </a:fld>
             <a:endParaRPr lang="de-DE"/>
           </a:p>
@@ -2180,7 +2183,7 @@
             </a:pPr>
             <a:fld id="{2B0A5491-2AB6-418D-A0A5-27EFB10721AE}" type="datetime1">
               <a:rPr lang="de-DE" smtClean="0"/>
-              <a:t>04.11.2021</a:t>
+              <a:t>07.11.2021</a:t>
             </a:fld>
             <a:endParaRPr lang="de-DE"/>
           </a:p>
@@ -2322,7 +2325,7 @@
             </a:pPr>
             <a:fld id="{A22EF75D-3769-45D0-9B1B-74B7EEF25FFD}" type="datetime1">
               <a:rPr lang="de-DE" smtClean="0"/>
-              <a:t>04.11.2021</a:t>
+              <a:t>07.11.2021</a:t>
             </a:fld>
             <a:endParaRPr lang="de-DE"/>
           </a:p>
@@ -2415,7 +2418,7 @@
             </a:pPr>
             <a:fld id="{DC98F520-8C38-4B57-B77C-51F623F32E18}" type="datetime1">
               <a:rPr lang="de-DE" smtClean="0"/>
-              <a:t>04.11.2021</a:t>
+              <a:t>07.11.2021</a:t>
             </a:fld>
             <a:endParaRPr lang="de-DE"/>
           </a:p>
@@ -2653,7 +2656,7 @@
             </a:pPr>
             <a:fld id="{0FC8A264-78C5-4F4B-BC65-5545A7021C32}" type="datetime1">
               <a:rPr lang="de-DE" smtClean="0"/>
-              <a:t>04.11.2021</a:t>
+              <a:t>07.11.2021</a:t>
             </a:fld>
             <a:endParaRPr lang="de-DE" dirty="0"/>
           </a:p>
@@ -2819,7 +2822,7 @@
             </a:pPr>
             <a:fld id="{0BA5BD3E-37D7-40E9-8039-11E22136C980}" type="datetime1">
               <a:rPr lang="de-DE" smtClean="0"/>
-              <a:t>04.11.2021</a:t>
+              <a:t>07.11.2021</a:t>
             </a:fld>
             <a:endParaRPr lang="de-DE"/>
           </a:p>
@@ -3102,7 +3105,7 @@
             </a:pPr>
             <a:fld id="{A8EF63C5-1ECD-4D51-982F-AFE89E605158}" type="datetime1">
               <a:rPr lang="de-DE" smtClean="0"/>
-              <a:t>04.11.2021</a:t>
+              <a:t>07.11.2021</a:t>
             </a:fld>
             <a:endParaRPr lang="de-DE"/>
           </a:p>
@@ -3373,7 +3376,7 @@
             </a:pPr>
             <a:fld id="{C46C8506-4BB6-439E-A7D5-6CF01D8F3BB2}" type="datetime1">
               <a:rPr lang="de-DE" smtClean="0"/>
-              <a:t>04.11.2021</a:t>
+              <a:t>07.11.2021</a:t>
             </a:fld>
             <a:endParaRPr lang="de-DE"/>
           </a:p>
@@ -4043,7 +4046,7 @@
             </a:pPr>
             <a:fld id="{2844689B-BD5B-4445-A6B3-2614A1E57663}" type="datetime1">
               <a:rPr lang="de-DE" smtClean="0"/>
-              <a:t>04.11.2021</a:t>
+              <a:t>07.11.2021</a:t>
             </a:fld>
             <a:endParaRPr lang="de-DE"/>
           </a:p>
@@ -4534,7 +4537,7 @@
 </file>
 
 <file path=ppt/slides/slide1.xml><?xml version="1.0" encoding="utf-8"?>
-<p:sld xmlns:a="http://schemas.openxmlformats.org/drawingml/2006/main" xmlns:r="http://schemas.openxmlformats.org/officeDocument/2006/relationships" xmlns:p="http://schemas.openxmlformats.org/presentationml/2006/main">
+<p:sld xmlns:a="http://schemas.openxmlformats.org/drawingml/2006/main" xmlns:r="http://schemas.openxmlformats.org/officeDocument/2006/relationships" xmlns:p="http://schemas.openxmlformats.org/presentationml/2006/main" show="0">
   <p:cSld>
     <p:spTree>
       <p:nvGrpSpPr>
@@ -4552,18 +4555,18 @@
       </p:grpSpPr>
       <p:sp>
         <p:nvSpPr>
-          <p:cNvPr id="2" name="Titel 1"/>
-          <p:cNvSpPr>
-            <a:spLocks noGrp="1"/>
-          </p:cNvSpPr>
-          <p:nvPr>
-            <p:ph type="ctrTitle"/>
+          <p:cNvPr id="4" name="Titel 3"/>
+          <p:cNvSpPr>
+            <a:spLocks noGrp="1"/>
+          </p:cNvSpPr>
+          <p:nvPr>
+            <p:ph type="title"/>
           </p:nvPr>
         </p:nvSpPr>
         <p:spPr>
           <a:xfrm>
-            <a:off x="685800" y="1597819"/>
-            <a:ext cx="7772400" cy="829915"/>
+            <a:off x="457200" y="206375"/>
+            <a:ext cx="5842992" cy="565150"/>
           </a:xfrm>
         </p:spPr>
         <p:txBody>
@@ -4571,148 +4574,720 @@
           <a:lstStyle/>
           <a:p>
             <a:r>
-              <a:rPr lang="de-DE" sz="2400" dirty="0"/>
-              <a:t>Building a Backend-Demo Team</a:t>
-            </a:r>
-          </a:p>
-        </p:txBody>
-      </p:sp>
-      <p:sp>
-        <p:nvSpPr>
-          <p:cNvPr id="3" name="Untertitel 2"/>
-          <p:cNvSpPr>
-            <a:spLocks noGrp="1"/>
-          </p:cNvSpPr>
-          <p:nvPr>
-            <p:ph type="subTitle" idx="1"/>
+              <a:rPr lang="en-GB" sz="2000" b="1" dirty="0"/>
+              <a:t>What is developed</a:t>
+            </a:r>
+            <a:endParaRPr lang="de-DE" sz="2000" dirty="0"/>
+          </a:p>
+        </p:txBody>
+      </p:sp>
+      <p:sp>
+        <p:nvSpPr>
+          <p:cNvPr id="2" name="Inhaltsplatzhalter 1"/>
+          <p:cNvSpPr>
+            <a:spLocks noGrp="1"/>
+          </p:cNvSpPr>
+          <p:nvPr>
+            <p:ph idx="1"/>
           </p:nvPr>
         </p:nvSpPr>
         <p:spPr>
           <a:xfrm>
-            <a:off x="3491880" y="2499742"/>
-            <a:ext cx="3024336" cy="1314450"/>
+            <a:off x="457200" y="1200150"/>
+            <a:ext cx="8229600" cy="3567113"/>
           </a:xfrm>
         </p:spPr>
         <p:txBody>
           <a:bodyPr/>
           <a:lstStyle/>
           <a:p>
-            <a:pPr marL="285750" indent="-285750" algn="l">
-              <a:buFont typeface="Arial" panose="020B0604020202020204" pitchFamily="34" charset="0"/>
-              <a:buChar char="•"/>
-            </a:pPr>
-            <a:r>
-              <a:rPr lang="de-DE" sz="1400" dirty="0">
-                <a:solidFill>
-                  <a:srgbClr val="000000"/>
-                </a:solidFill>
-                <a:latin typeface="Open Sans" panose="020B0606030504020204" pitchFamily="34" charset="0"/>
-              </a:rPr>
-              <a:t>Rakesh Kumar</a:t>
-            </a:r>
-          </a:p>
-          <a:p>
-            <a:pPr marL="285750" indent="-285750" algn="l">
-              <a:buFont typeface="Arial" panose="020B0604020202020204" pitchFamily="34" charset="0"/>
-              <a:buChar char="•"/>
-            </a:pPr>
-            <a:r>
-              <a:rPr lang="en-GB" sz="1400" b="0" i="0" u="none" strike="noStrike" dirty="0">
-                <a:solidFill>
-                  <a:srgbClr val="000000"/>
-                </a:solidFill>
-                <a:effectLst/>
-                <a:latin typeface="Open Sans" panose="020B0606030504020204" pitchFamily="34" charset="0"/>
-              </a:rPr>
-              <a:t>Bibek </a:t>
-            </a:r>
-            <a:r>
-              <a:rPr lang="en-GB" sz="1400" b="0" i="0" u="none" strike="noStrike" dirty="0" err="1">
-                <a:solidFill>
-                  <a:srgbClr val="000000"/>
-                </a:solidFill>
-                <a:effectLst/>
-                <a:latin typeface="Open Sans" panose="020B0606030504020204" pitchFamily="34" charset="0"/>
-              </a:rPr>
-              <a:t>Gaihre</a:t>
-            </a:r>
-            <a:endParaRPr lang="de-DE" sz="1400" b="0" i="0" u="none" strike="noStrike" dirty="0">
-              <a:solidFill>
-                <a:srgbClr val="000000"/>
-              </a:solidFill>
-              <a:effectLst/>
-              <a:latin typeface="Open Sans" panose="020B0606030504020204" pitchFamily="34" charset="0"/>
-            </a:endParaRPr>
-          </a:p>
-          <a:p>
-            <a:pPr marL="285750" indent="-285750" algn="l">
-              <a:buFont typeface="Arial" panose="020B0604020202020204" pitchFamily="34" charset="0"/>
-              <a:buChar char="•"/>
-            </a:pPr>
-            <a:r>
-              <a:rPr lang="en-GB" sz="1400" b="0" i="0" u="none" strike="noStrike" dirty="0">
-                <a:solidFill>
-                  <a:srgbClr val="000000"/>
-                </a:solidFill>
-                <a:effectLst/>
-                <a:latin typeface="Open Sans" panose="020B0606030504020204" pitchFamily="34" charset="0"/>
-              </a:rPr>
-              <a:t>Julia Anna </a:t>
-            </a:r>
-            <a:r>
-              <a:rPr lang="en-GB" sz="1400" b="0" i="0" u="none" strike="noStrike" dirty="0" err="1">
-                <a:solidFill>
-                  <a:srgbClr val="000000"/>
-                </a:solidFill>
-                <a:effectLst/>
-                <a:latin typeface="Open Sans" panose="020B0606030504020204" pitchFamily="34" charset="0"/>
-              </a:rPr>
-              <a:t>Nürnberg</a:t>
-            </a:r>
-            <a:endParaRPr lang="de-DE" sz="1400" dirty="0">
-              <a:solidFill>
-                <a:srgbClr val="000000"/>
-              </a:solidFill>
-              <a:latin typeface="Open Sans" panose="020B0606030504020204" pitchFamily="34" charset="0"/>
-            </a:endParaRPr>
-          </a:p>
-          <a:p>
-            <a:pPr marL="285750" indent="-285750" algn="l">
-              <a:buFont typeface="Arial" panose="020B0604020202020204" pitchFamily="34" charset="0"/>
-              <a:buChar char="•"/>
-            </a:pPr>
-            <a:r>
-              <a:rPr lang="en-GB" sz="1400" b="0" i="0" u="none" strike="noStrike" dirty="0">
-                <a:solidFill>
-                  <a:srgbClr val="000000"/>
-                </a:solidFill>
-                <a:effectLst/>
-                <a:latin typeface="Open Sans" panose="020B0606030504020204" pitchFamily="34" charset="0"/>
-              </a:rPr>
-              <a:t>Nisha Devi</a:t>
+            <a:pPr algn="l">
+              <a:buAutoNum type="arabicPeriod"/>
+            </a:pPr>
+            <a:r>
+              <a:rPr lang="de-DE" sz="1400" dirty="0"/>
+              <a:t>Seven Rest APIs </a:t>
+            </a:r>
+            <a:r>
+              <a:rPr lang="de-DE" sz="1400" dirty="0" err="1"/>
+              <a:t>to</a:t>
+            </a:r>
+            <a:r>
+              <a:rPr lang="de-DE" sz="1400" dirty="0"/>
+              <a:t> do </a:t>
+            </a:r>
+            <a:r>
+              <a:rPr lang="de-DE" sz="1400" dirty="0" err="1"/>
+              <a:t>the</a:t>
+            </a:r>
+            <a:r>
+              <a:rPr lang="de-DE" sz="1400" dirty="0"/>
+              <a:t> CRUD </a:t>
+            </a:r>
+            <a:r>
+              <a:rPr lang="de-DE" sz="1400" dirty="0" err="1"/>
+              <a:t>operation</a:t>
+            </a:r>
+            <a:r>
+              <a:rPr lang="de-DE" sz="1400" dirty="0"/>
+              <a:t> </a:t>
+            </a:r>
+            <a:r>
+              <a:rPr lang="de-DE" sz="1400" dirty="0" err="1"/>
+              <a:t>using</a:t>
+            </a:r>
+            <a:r>
+              <a:rPr lang="de-DE" sz="1400" dirty="0"/>
+              <a:t> HTTP </a:t>
+            </a:r>
+            <a:r>
+              <a:rPr lang="de-DE" sz="1400" dirty="0" err="1"/>
+              <a:t>methods</a:t>
+            </a:r>
+            <a:r>
+              <a:rPr lang="de-DE" sz="1400" dirty="0"/>
+              <a:t>.</a:t>
+            </a:r>
+          </a:p>
+          <a:p>
+            <a:pPr algn="l">
+              <a:buAutoNum type="arabicPeriod"/>
+            </a:pPr>
+            <a:r>
+              <a:rPr lang="de-DE" sz="1400" dirty="0" err="1"/>
+              <a:t>Using</a:t>
+            </a:r>
+            <a:r>
+              <a:rPr lang="de-DE" sz="1400" dirty="0"/>
+              <a:t> </a:t>
+            </a:r>
+            <a:r>
+              <a:rPr lang="de-DE" sz="1400" dirty="0" err="1"/>
+              <a:t>NodeJs</a:t>
+            </a:r>
+            <a:r>
+              <a:rPr lang="de-DE" sz="1400" dirty="0"/>
+              <a:t> and MYSQL </a:t>
+            </a:r>
+            <a:r>
+              <a:rPr lang="de-DE" sz="1400" dirty="0" err="1"/>
+              <a:t>database</a:t>
             </a:r>
             <a:endParaRPr lang="de-DE" sz="1400" dirty="0"/>
+          </a:p>
+          <a:p>
+            <a:pPr marL="0" indent="0" algn="l">
+              <a:buNone/>
+            </a:pPr>
+            <a:r>
+              <a:rPr lang="de-DE" sz="1400" dirty="0"/>
+              <a:t>3. a. </a:t>
+            </a:r>
+            <a:r>
+              <a:rPr lang="de-DE" sz="1400" dirty="0" err="1"/>
+              <a:t>Installed</a:t>
+            </a:r>
+            <a:r>
+              <a:rPr lang="de-DE" sz="1400" dirty="0"/>
+              <a:t> MYSQL, </a:t>
+            </a:r>
+            <a:r>
+              <a:rPr lang="de-DE" sz="1400" dirty="0" err="1"/>
+              <a:t>created</a:t>
+            </a:r>
+            <a:r>
+              <a:rPr lang="de-DE" sz="1400" dirty="0"/>
+              <a:t> a </a:t>
+            </a:r>
+            <a:r>
+              <a:rPr lang="de-DE" sz="1400" dirty="0" err="1"/>
+              <a:t>databased</a:t>
+            </a:r>
+            <a:r>
+              <a:rPr lang="de-DE" sz="1400" dirty="0"/>
+              <a:t> and </a:t>
+            </a:r>
+            <a:r>
+              <a:rPr lang="de-DE" sz="1400" dirty="0" err="1"/>
+              <a:t>user</a:t>
+            </a:r>
+            <a:r>
+              <a:rPr lang="de-DE" sz="1400" dirty="0"/>
+              <a:t> and </a:t>
+            </a:r>
+            <a:r>
+              <a:rPr lang="de-DE" sz="1400" dirty="0" err="1"/>
+              <a:t>login</a:t>
+            </a:r>
+            <a:r>
+              <a:rPr lang="de-DE" sz="1400" dirty="0"/>
+              <a:t> </a:t>
+            </a:r>
+            <a:r>
+              <a:rPr lang="de-DE" sz="1400" dirty="0" err="1"/>
+              <a:t>table</a:t>
+            </a:r>
+            <a:endParaRPr lang="de-DE" sz="1400" dirty="0"/>
+          </a:p>
+          <a:p>
+            <a:pPr marL="0" indent="0" algn="l">
+              <a:buNone/>
+            </a:pPr>
+            <a:r>
+              <a:rPr lang="de-DE" sz="1400" dirty="0"/>
+              <a:t>     b. </a:t>
+            </a:r>
+            <a:r>
+              <a:rPr lang="de-DE" sz="1400" dirty="0" err="1"/>
+              <a:t>Installed</a:t>
+            </a:r>
+            <a:r>
+              <a:rPr lang="de-DE" sz="1400" dirty="0"/>
+              <a:t> </a:t>
+            </a:r>
+            <a:r>
+              <a:rPr lang="de-DE" sz="1400" dirty="0" err="1"/>
+              <a:t>NodeJs</a:t>
+            </a:r>
+            <a:r>
+              <a:rPr lang="de-DE" sz="1400" dirty="0"/>
+              <a:t> and </a:t>
+            </a:r>
+            <a:r>
+              <a:rPr lang="de-DE" sz="1400" dirty="0" err="1"/>
+              <a:t>installed</a:t>
+            </a:r>
+            <a:r>
+              <a:rPr lang="de-DE" sz="1400" dirty="0"/>
+              <a:t> </a:t>
+            </a:r>
+            <a:r>
+              <a:rPr lang="de-DE" sz="1400" dirty="0" err="1"/>
+              <a:t>packages</a:t>
+            </a:r>
+            <a:r>
+              <a:rPr lang="de-DE" sz="1400" dirty="0"/>
+              <a:t> </a:t>
+            </a:r>
+            <a:r>
+              <a:rPr lang="de-DE" sz="1400" dirty="0" err="1"/>
+              <a:t>express</a:t>
+            </a:r>
+            <a:r>
+              <a:rPr lang="de-DE" sz="1400" dirty="0"/>
+              <a:t>, </a:t>
+            </a:r>
+            <a:r>
+              <a:rPr lang="de-DE" sz="1400" dirty="0" err="1"/>
+              <a:t>mysql</a:t>
+            </a:r>
+            <a:r>
+              <a:rPr lang="de-DE" sz="1400" dirty="0"/>
+              <a:t>, body-parser.</a:t>
+            </a:r>
+          </a:p>
+          <a:p>
+            <a:pPr algn="l">
+              <a:buAutoNum type="arabicPeriod" startAt="4"/>
+            </a:pPr>
+            <a:r>
+              <a:rPr lang="de-DE" sz="1400" dirty="0" err="1"/>
+              <a:t>Created</a:t>
+            </a:r>
+            <a:r>
+              <a:rPr lang="de-DE" sz="1400" dirty="0"/>
+              <a:t> App.js and </a:t>
+            </a:r>
+            <a:r>
+              <a:rPr lang="de-DE" sz="1400" dirty="0" err="1"/>
+              <a:t>coded</a:t>
+            </a:r>
+            <a:r>
+              <a:rPr lang="de-DE" sz="1400" dirty="0"/>
+              <a:t> </a:t>
+            </a:r>
+            <a:r>
+              <a:rPr lang="de-DE" sz="1400" dirty="0" err="1"/>
+              <a:t>port</a:t>
+            </a:r>
+            <a:r>
+              <a:rPr lang="de-DE" sz="1400" dirty="0"/>
+              <a:t> 4000 </a:t>
+            </a:r>
+            <a:r>
+              <a:rPr lang="de-DE" sz="1400" dirty="0" err="1"/>
+              <a:t>for</a:t>
+            </a:r>
+            <a:r>
+              <a:rPr lang="de-DE" sz="1400" dirty="0"/>
+              <a:t> web </a:t>
+            </a:r>
+            <a:r>
+              <a:rPr lang="de-DE" sz="1400" dirty="0" err="1"/>
+              <a:t>server</a:t>
+            </a:r>
+            <a:r>
+              <a:rPr lang="de-DE" sz="1400" dirty="0"/>
+              <a:t>.</a:t>
+            </a:r>
+          </a:p>
+          <a:p>
+            <a:pPr algn="l">
+              <a:buAutoNum type="arabicPeriod" startAt="4"/>
+            </a:pPr>
+            <a:r>
+              <a:rPr lang="de-DE" sz="1400" dirty="0" err="1"/>
+              <a:t>Created</a:t>
+            </a:r>
+            <a:r>
+              <a:rPr lang="de-DE" sz="1400" dirty="0"/>
+              <a:t> </a:t>
+            </a:r>
+            <a:r>
+              <a:rPr lang="de-DE" sz="1400" dirty="0" err="1"/>
+              <a:t>middleware</a:t>
+            </a:r>
+            <a:r>
+              <a:rPr lang="de-DE" sz="1400" dirty="0"/>
+              <a:t> </a:t>
+            </a:r>
+            <a:r>
+              <a:rPr lang="de-DE" sz="1400" dirty="0" err="1"/>
+              <a:t>for</a:t>
+            </a:r>
+            <a:r>
+              <a:rPr lang="de-DE" sz="1400" dirty="0"/>
+              <a:t> </a:t>
+            </a:r>
+            <a:r>
+              <a:rPr lang="de-DE" sz="1400" dirty="0" err="1"/>
+              <a:t>user</a:t>
+            </a:r>
+            <a:r>
+              <a:rPr lang="de-DE" sz="1400" dirty="0"/>
+              <a:t> </a:t>
+            </a:r>
+            <a:r>
+              <a:rPr lang="de-DE" sz="1400" dirty="0" err="1"/>
+              <a:t>routes</a:t>
+            </a:r>
+            <a:r>
+              <a:rPr lang="de-DE" sz="1400" dirty="0"/>
+              <a:t>( </a:t>
+            </a:r>
+            <a:r>
+              <a:rPr lang="de-DE" sz="1400" dirty="0" err="1"/>
+              <a:t>corresponding</a:t>
+            </a:r>
+            <a:r>
+              <a:rPr lang="de-DE" sz="1400" dirty="0"/>
+              <a:t> </a:t>
+            </a:r>
+            <a:r>
+              <a:rPr lang="de-DE" sz="1400" dirty="0" err="1"/>
+              <a:t>to</a:t>
+            </a:r>
+            <a:r>
+              <a:rPr lang="de-DE" sz="1400" dirty="0"/>
+              <a:t> </a:t>
+            </a:r>
+            <a:r>
+              <a:rPr lang="de-DE" sz="1400" dirty="0" err="1"/>
+              <a:t>endpoints</a:t>
+            </a:r>
+            <a:r>
+              <a:rPr lang="de-DE" sz="1400" dirty="0"/>
+              <a:t>)</a:t>
+            </a:r>
+          </a:p>
+          <a:p>
+            <a:pPr algn="l">
+              <a:buAutoNum type="arabicPeriod" startAt="4"/>
+            </a:pPr>
+            <a:r>
+              <a:rPr lang="de-DE" sz="1400" dirty="0" err="1"/>
+              <a:t>Created</a:t>
+            </a:r>
+            <a:r>
+              <a:rPr lang="de-DE" sz="1400" dirty="0"/>
+              <a:t> user-routes.js </a:t>
+            </a:r>
+            <a:r>
+              <a:rPr lang="de-DE" sz="1400" dirty="0" err="1"/>
+              <a:t>file</a:t>
+            </a:r>
+            <a:r>
+              <a:rPr lang="de-DE" sz="1400" dirty="0"/>
+              <a:t> </a:t>
+            </a:r>
+            <a:r>
+              <a:rPr lang="de-DE" sz="1400" dirty="0" err="1"/>
+              <a:t>specifying</a:t>
+            </a:r>
+            <a:r>
+              <a:rPr lang="de-DE" sz="1400" dirty="0"/>
+              <a:t> all </a:t>
+            </a:r>
+            <a:r>
+              <a:rPr lang="de-DE" sz="1400" dirty="0" err="1"/>
+              <a:t>the</a:t>
+            </a:r>
+            <a:r>
+              <a:rPr lang="de-DE" sz="1400" dirty="0"/>
+              <a:t> </a:t>
+            </a:r>
+            <a:r>
+              <a:rPr lang="de-DE" sz="1400" dirty="0" err="1"/>
+              <a:t>routes</a:t>
+            </a:r>
+            <a:r>
+              <a:rPr lang="de-DE" sz="1400" dirty="0"/>
+              <a:t>.</a:t>
+            </a:r>
+          </a:p>
+          <a:p>
+            <a:pPr algn="l">
+              <a:buAutoNum type="arabicPeriod" startAt="4"/>
+            </a:pPr>
+            <a:r>
+              <a:rPr lang="de-DE" sz="1400" dirty="0" err="1"/>
+              <a:t>Created</a:t>
+            </a:r>
+            <a:r>
+              <a:rPr lang="de-DE" sz="1400" dirty="0"/>
+              <a:t> database.js </a:t>
+            </a:r>
+            <a:r>
+              <a:rPr lang="de-DE" sz="1400" dirty="0" err="1"/>
+              <a:t>file</a:t>
+            </a:r>
+            <a:r>
+              <a:rPr lang="de-DE" sz="1400" dirty="0"/>
+              <a:t> </a:t>
+            </a:r>
+            <a:r>
+              <a:rPr lang="de-DE" sz="1400" dirty="0" err="1"/>
+              <a:t>definding</a:t>
+            </a:r>
+            <a:r>
+              <a:rPr lang="de-DE" sz="1400" dirty="0"/>
+              <a:t> </a:t>
+            </a:r>
+            <a:r>
+              <a:rPr lang="de-DE" sz="1400" dirty="0" err="1"/>
+              <a:t>the</a:t>
+            </a:r>
+            <a:r>
+              <a:rPr lang="de-DE" sz="1400" dirty="0"/>
+              <a:t> </a:t>
+            </a:r>
+            <a:r>
+              <a:rPr lang="de-DE" sz="1400" dirty="0" err="1"/>
+              <a:t>connection</a:t>
+            </a:r>
+            <a:r>
+              <a:rPr lang="de-DE" sz="1400" dirty="0"/>
+              <a:t> </a:t>
+            </a:r>
+            <a:r>
+              <a:rPr lang="de-DE" sz="1400" dirty="0" err="1"/>
+              <a:t>details</a:t>
+            </a:r>
+            <a:r>
+              <a:rPr lang="de-DE" sz="1400" dirty="0"/>
+              <a:t> and </a:t>
+            </a:r>
+            <a:r>
+              <a:rPr lang="de-DE" sz="1400" dirty="0" err="1"/>
+              <a:t>included</a:t>
+            </a:r>
+            <a:r>
+              <a:rPr lang="de-DE" sz="1400" dirty="0"/>
+              <a:t> in controller.js  </a:t>
+            </a:r>
+          </a:p>
+          <a:p>
+            <a:pPr>
+              <a:buFont typeface="Arial" charset="0"/>
+              <a:buAutoNum type="arabicPeriod" startAt="4"/>
+            </a:pPr>
+            <a:r>
+              <a:rPr lang="de-DE" sz="1400" dirty="0" err="1"/>
+              <a:t>Created</a:t>
+            </a:r>
+            <a:r>
+              <a:rPr lang="de-DE" sz="1400" dirty="0"/>
+              <a:t> controller.js </a:t>
+            </a:r>
+            <a:r>
+              <a:rPr lang="de-DE" sz="1400" dirty="0" err="1"/>
+              <a:t>for</a:t>
+            </a:r>
+            <a:r>
+              <a:rPr lang="de-DE" sz="1400" dirty="0"/>
+              <a:t> </a:t>
+            </a:r>
+            <a:r>
+              <a:rPr lang="de-DE" sz="1400" dirty="0" err="1"/>
+              <a:t>defining</a:t>
+            </a:r>
+            <a:r>
+              <a:rPr lang="de-DE" sz="1400" dirty="0"/>
+              <a:t> </a:t>
+            </a:r>
+            <a:r>
+              <a:rPr lang="de-DE" sz="1400" dirty="0" err="1"/>
+              <a:t>each</a:t>
+            </a:r>
+            <a:r>
+              <a:rPr lang="de-DE" sz="1400" dirty="0"/>
+              <a:t> individual </a:t>
+            </a:r>
+            <a:r>
+              <a:rPr lang="de-DE" sz="1400" dirty="0" err="1"/>
+              <a:t>function</a:t>
+            </a:r>
+            <a:r>
+              <a:rPr lang="de-DE" sz="1400" dirty="0"/>
+              <a:t> </a:t>
+            </a:r>
+            <a:r>
+              <a:rPr lang="de-DE" sz="1400" dirty="0" err="1"/>
+              <a:t>corresponding</a:t>
+            </a:r>
+            <a:r>
+              <a:rPr lang="de-DE" sz="1400" dirty="0"/>
+              <a:t> </a:t>
+            </a:r>
+            <a:r>
+              <a:rPr lang="de-DE" sz="1400" dirty="0" err="1"/>
+              <a:t>to</a:t>
+            </a:r>
+            <a:r>
+              <a:rPr lang="de-DE" sz="1400" dirty="0"/>
+              <a:t> </a:t>
+            </a:r>
+            <a:r>
+              <a:rPr lang="de-DE" sz="1400" dirty="0" err="1"/>
+              <a:t>each</a:t>
+            </a:r>
+            <a:r>
+              <a:rPr lang="de-DE" sz="1400" dirty="0"/>
+              <a:t> route </a:t>
+            </a:r>
+            <a:r>
+              <a:rPr lang="de-DE" sz="1400" dirty="0" err="1"/>
+              <a:t>to</a:t>
+            </a:r>
+            <a:r>
+              <a:rPr lang="de-DE" sz="1400" dirty="0"/>
+              <a:t> handle HTTP </a:t>
+            </a:r>
+            <a:r>
+              <a:rPr lang="de-DE" sz="1400" dirty="0" err="1"/>
+              <a:t>request</a:t>
+            </a:r>
+            <a:r>
+              <a:rPr lang="de-DE" sz="1400" dirty="0"/>
+              <a:t>.</a:t>
+            </a:r>
+          </a:p>
+          <a:p>
+            <a:pPr marL="0" indent="0" algn="l">
+              <a:buNone/>
+            </a:pPr>
+            <a:endParaRPr lang="de-DE" sz="1400" dirty="0"/>
+          </a:p>
+          <a:p>
+            <a:pPr marL="0" indent="0" algn="l">
+              <a:buNone/>
+            </a:pPr>
+            <a:r>
+              <a:rPr lang="de-DE" sz="1400" dirty="0"/>
+              <a:t>9. Tricky </a:t>
+            </a:r>
+            <a:r>
+              <a:rPr lang="de-DE" sz="1400" dirty="0" err="1"/>
+              <a:t>aspect</a:t>
+            </a:r>
+            <a:r>
+              <a:rPr lang="de-DE" sz="1400" dirty="0"/>
+              <a:t>: </a:t>
+            </a:r>
+            <a:r>
+              <a:rPr lang="de-DE" sz="1400" dirty="0" err="1"/>
+              <a:t>To</a:t>
+            </a:r>
+            <a:r>
+              <a:rPr lang="de-DE" sz="1400" dirty="0"/>
+              <a:t> </a:t>
+            </a:r>
+            <a:r>
+              <a:rPr lang="de-DE" sz="1400" dirty="0" err="1"/>
+              <a:t>encrypt</a:t>
+            </a:r>
+            <a:r>
+              <a:rPr lang="de-DE" sz="1400" dirty="0"/>
+              <a:t> </a:t>
+            </a:r>
+            <a:r>
+              <a:rPr lang="de-DE" sz="1400" dirty="0" err="1"/>
+              <a:t>password</a:t>
+            </a:r>
+            <a:r>
+              <a:rPr lang="de-DE" sz="1400" dirty="0"/>
+              <a:t> and </a:t>
+            </a:r>
+            <a:r>
+              <a:rPr lang="de-DE" sz="1400" dirty="0" err="1"/>
+              <a:t>add</a:t>
+            </a:r>
+            <a:r>
+              <a:rPr lang="de-DE" sz="1400" dirty="0"/>
+              <a:t> </a:t>
+            </a:r>
+            <a:r>
+              <a:rPr lang="de-DE" sz="1400" dirty="0" err="1"/>
+              <a:t>authorization</a:t>
+            </a:r>
+            <a:r>
+              <a:rPr lang="de-DE" sz="1400" dirty="0"/>
+              <a:t> </a:t>
+            </a:r>
+            <a:r>
+              <a:rPr lang="de-DE" sz="1400" dirty="0" err="1"/>
+              <a:t>for</a:t>
+            </a:r>
+            <a:r>
+              <a:rPr lang="de-DE" sz="1400" dirty="0"/>
+              <a:t> </a:t>
+            </a:r>
+            <a:r>
+              <a:rPr lang="de-DE" sz="1400" dirty="0" err="1"/>
+              <a:t>each</a:t>
+            </a:r>
+            <a:r>
+              <a:rPr lang="de-DE" sz="1400" dirty="0"/>
+              <a:t> route.</a:t>
+            </a:r>
+          </a:p>
+          <a:p>
+            <a:pPr marL="0" indent="0" algn="l">
+              <a:buNone/>
+            </a:pPr>
+            <a:r>
+              <a:rPr lang="de-DE" sz="1400" dirty="0"/>
+              <a:t> </a:t>
+            </a:r>
+            <a:r>
+              <a:rPr lang="de-DE" sz="1400" dirty="0" err="1"/>
+              <a:t>Used</a:t>
+            </a:r>
+            <a:r>
+              <a:rPr lang="de-DE" sz="1400" dirty="0"/>
+              <a:t>: </a:t>
+            </a:r>
+            <a:r>
+              <a:rPr lang="de-DE" sz="1400" dirty="0" err="1"/>
+              <a:t>jsonwebtoken</a:t>
+            </a:r>
+            <a:r>
+              <a:rPr lang="de-DE" sz="1400" dirty="0"/>
+              <a:t>  </a:t>
+            </a:r>
+            <a:r>
+              <a:rPr lang="de-DE" sz="1400" dirty="0" err="1"/>
+              <a:t>bcryptjs</a:t>
+            </a:r>
+            <a:r>
+              <a:rPr lang="de-DE" sz="1400" dirty="0"/>
+              <a:t> </a:t>
+            </a:r>
+            <a:r>
+              <a:rPr lang="de-DE" sz="1400" dirty="0" err="1"/>
+              <a:t>packages</a:t>
+            </a:r>
+            <a:endParaRPr lang="de-DE" sz="1400" dirty="0"/>
+          </a:p>
+          <a:p>
+            <a:pPr marL="0" indent="0" algn="l">
+              <a:buNone/>
+            </a:pPr>
+            <a:endParaRPr lang="de-DE" sz="1400" dirty="0"/>
+          </a:p>
+          <a:p>
+            <a:pPr marL="0" indent="0" algn="l">
+              <a:buNone/>
+            </a:pPr>
+            <a:endParaRPr lang="de-DE" sz="1400" dirty="0"/>
+          </a:p>
+        </p:txBody>
+      </p:sp>
+      <p:sp>
+        <p:nvSpPr>
+          <p:cNvPr id="11" name="Datumsplatzhalter 10"/>
+          <p:cNvSpPr>
+            <a:spLocks noGrp="1"/>
+          </p:cNvSpPr>
+          <p:nvPr>
+            <p:ph type="dt" sz="half" idx="10"/>
+          </p:nvPr>
+        </p:nvSpPr>
+        <p:spPr/>
+        <p:txBody>
+          <a:bodyPr/>
+          <a:lstStyle/>
+          <a:p>
+            <a:pPr>
+              <a:defRPr/>
+            </a:pPr>
+            <a:fld id="{D76B2423-297A-4B0D-AB43-E773970A055B}" type="datetime1">
+              <a:rPr lang="de-DE" smtClean="0"/>
+              <a:t>07.11.2021</a:t>
+            </a:fld>
+            <a:endParaRPr lang="de-DE" dirty="0"/>
+          </a:p>
+        </p:txBody>
+      </p:sp>
+      <p:sp>
+        <p:nvSpPr>
+          <p:cNvPr id="12" name="Foliennummernplatzhalter 11"/>
+          <p:cNvSpPr>
+            <a:spLocks noGrp="1"/>
+          </p:cNvSpPr>
+          <p:nvPr>
+            <p:ph type="sldNum" sz="quarter" idx="12"/>
+          </p:nvPr>
+        </p:nvSpPr>
+        <p:spPr/>
+        <p:txBody>
+          <a:bodyPr/>
+          <a:lstStyle/>
+          <a:p>
+            <a:pPr>
+              <a:defRPr/>
+            </a:pPr>
+            <a:fld id="{619C166B-5E38-4CD5-9E59-7E2FFEC9FB68}" type="slidenum">
+              <a:rPr lang="de-DE" smtClean="0"/>
+              <a:pPr>
+                <a:defRPr/>
+              </a:pPr>
+              <a:t>1</a:t>
+            </a:fld>
+            <a:endParaRPr lang="de-DE"/>
           </a:p>
         </p:txBody>
       </p:sp>
     </p:spTree>
     <p:extLst>
       <p:ext uri="{BB962C8B-B14F-4D97-AF65-F5344CB8AC3E}">
-        <p14:creationId xmlns:p14="http://schemas.microsoft.com/office/powerpoint/2010/main" val="3594172235"/>
+        <p14:creationId xmlns:p14="http://schemas.microsoft.com/office/powerpoint/2010/main" val="1220989824"/>
       </p:ext>
     </p:extLst>
   </p:cSld>
   <p:clrMapOvr>
     <a:masterClrMapping/>
   </p:clrMapOvr>
-  <mc:AlternateContent xmlns:mc="http://schemas.openxmlformats.org/markup-compatibility/2006">
-    <mc:Choice xmlns:p14="http://schemas.microsoft.com/office/powerpoint/2010/main" Requires="p14">
-      <p:transition spd="slow" p14:dur="2000" advTm="16756"/>
-    </mc:Choice>
-    <mc:Fallback>
-      <p:transition spd="slow" advTm="16756"/>
-    </mc:Fallback>
-  </mc:AlternateContent>
 </p:sld>
 </file>
 
@@ -4755,7 +5330,7 @@
           <a:p>
             <a:r>
               <a:rPr lang="en-GB" sz="2000" b="1" dirty="0"/>
-              <a:t>Setup the demo and resources</a:t>
+              <a:t>Demo</a:t>
             </a:r>
             <a:endParaRPr lang="de-DE" sz="2000" dirty="0"/>
           </a:p>
@@ -4771,7 +5346,415 @@
             <p:ph idx="1"/>
           </p:nvPr>
         </p:nvSpPr>
+        <p:spPr>
+          <a:xfrm>
+            <a:off x="457200" y="1200150"/>
+            <a:ext cx="8229600" cy="3567113"/>
+          </a:xfrm>
+        </p:spPr>
+        <p:txBody>
+          <a:bodyPr/>
+          <a:lstStyle/>
+          <a:p>
+            <a:pPr marL="0" indent="0" algn="l">
+              <a:buNone/>
+            </a:pPr>
+            <a:r>
+              <a:rPr lang="de-DE" sz="1400" dirty="0" err="1"/>
+              <a:t>What</a:t>
+            </a:r>
+            <a:r>
+              <a:rPr lang="de-DE" sz="1400" dirty="0"/>
+              <a:t> </a:t>
+            </a:r>
+            <a:r>
+              <a:rPr lang="de-DE" sz="1400" dirty="0" err="1"/>
+              <a:t>is</a:t>
+            </a:r>
+            <a:r>
+              <a:rPr lang="de-DE" sz="1400" dirty="0"/>
+              <a:t> </a:t>
+            </a:r>
+            <a:r>
+              <a:rPr lang="de-DE" sz="1400" dirty="0" err="1"/>
+              <a:t>part</a:t>
+            </a:r>
+            <a:r>
+              <a:rPr lang="de-DE" sz="1400" dirty="0"/>
+              <a:t> </a:t>
+            </a:r>
+            <a:r>
+              <a:rPr lang="de-DE" sz="1400" dirty="0" err="1"/>
+              <a:t>of</a:t>
+            </a:r>
+            <a:r>
+              <a:rPr lang="de-DE" sz="1400" dirty="0"/>
+              <a:t> Demonstration code:</a:t>
+            </a:r>
+          </a:p>
+          <a:p>
+            <a:pPr algn="l">
+              <a:buAutoNum type="arabicPeriod"/>
+            </a:pPr>
+            <a:endParaRPr lang="de-DE" sz="1400" dirty="0"/>
+          </a:p>
+          <a:p>
+            <a:pPr algn="l">
+              <a:buAutoNum type="arabicPeriod"/>
+            </a:pPr>
+            <a:r>
+              <a:rPr lang="de-DE" sz="1400" dirty="0"/>
+              <a:t>Five APIs </a:t>
+            </a:r>
+            <a:r>
+              <a:rPr lang="de-DE" sz="1400" dirty="0" err="1"/>
+              <a:t>to</a:t>
+            </a:r>
+            <a:r>
+              <a:rPr lang="de-DE" sz="1400" dirty="0"/>
+              <a:t> do </a:t>
+            </a:r>
+            <a:r>
+              <a:rPr lang="de-DE" sz="1400" dirty="0" err="1"/>
+              <a:t>the</a:t>
+            </a:r>
+            <a:r>
+              <a:rPr lang="de-DE" sz="1400" dirty="0"/>
+              <a:t> CRUD </a:t>
+            </a:r>
+            <a:r>
+              <a:rPr lang="de-DE" sz="1400" dirty="0" err="1"/>
+              <a:t>operations</a:t>
+            </a:r>
+            <a:r>
+              <a:rPr lang="de-DE" sz="1400" dirty="0"/>
+              <a:t> </a:t>
+            </a:r>
+            <a:r>
+              <a:rPr lang="de-DE" sz="1400" dirty="0" err="1"/>
+              <a:t>using</a:t>
+            </a:r>
+            <a:r>
+              <a:rPr lang="de-DE" sz="1400" dirty="0"/>
+              <a:t> HTTP </a:t>
+            </a:r>
+            <a:r>
+              <a:rPr lang="de-DE" sz="1400" dirty="0" err="1"/>
+              <a:t>methods</a:t>
+            </a:r>
+            <a:endParaRPr lang="de-DE" sz="1400" dirty="0"/>
+          </a:p>
+          <a:p>
+            <a:pPr algn="l">
+              <a:buAutoNum type="arabicPeriod"/>
+            </a:pPr>
+            <a:r>
+              <a:rPr lang="de-DE" sz="1400" dirty="0" err="1"/>
+              <a:t>Used</a:t>
+            </a:r>
+            <a:r>
+              <a:rPr lang="de-DE" sz="1400" dirty="0"/>
+              <a:t>: </a:t>
+            </a:r>
+            <a:r>
+              <a:rPr lang="de-DE" sz="1400" dirty="0" err="1"/>
+              <a:t>NodeJs</a:t>
+            </a:r>
+            <a:r>
+              <a:rPr lang="de-DE" sz="1400" dirty="0"/>
+              <a:t>, </a:t>
+            </a:r>
+            <a:r>
+              <a:rPr lang="de-DE" sz="1400" dirty="0" err="1"/>
+              <a:t>Express</a:t>
+            </a:r>
+            <a:r>
+              <a:rPr lang="de-DE" sz="1400" dirty="0"/>
+              <a:t> and MYSQL </a:t>
+            </a:r>
+            <a:r>
+              <a:rPr lang="de-DE" sz="1400" dirty="0" err="1"/>
+              <a:t>database</a:t>
+            </a:r>
+            <a:endParaRPr lang="de-DE" sz="1400" dirty="0"/>
+          </a:p>
+          <a:p>
+            <a:pPr marL="0" indent="0" algn="l">
+              <a:buNone/>
+            </a:pPr>
+            <a:endParaRPr lang="de-DE" sz="1400" dirty="0"/>
+          </a:p>
+          <a:p>
+            <a:pPr marL="0" indent="0" algn="l">
+              <a:buNone/>
+            </a:pPr>
+            <a:r>
+              <a:rPr lang="de-DE" sz="1400" dirty="0"/>
+              <a:t>Tricky </a:t>
+            </a:r>
+            <a:r>
+              <a:rPr lang="de-DE" sz="1400" dirty="0" err="1"/>
+              <a:t>aspect</a:t>
+            </a:r>
+            <a:r>
+              <a:rPr lang="de-DE" sz="1400" dirty="0"/>
+              <a:t>: </a:t>
+            </a:r>
+          </a:p>
+          <a:p>
+            <a:pPr marL="0" indent="0" algn="l">
+              <a:buNone/>
+            </a:pPr>
+            <a:endParaRPr lang="de-DE" sz="1400" dirty="0"/>
+          </a:p>
+          <a:p>
+            <a:pPr>
+              <a:buFont typeface="Arial" charset="0"/>
+              <a:buAutoNum type="arabicPeriod"/>
+            </a:pPr>
+            <a:r>
+              <a:rPr lang="de-DE" sz="1400" dirty="0" err="1"/>
+              <a:t>To</a:t>
+            </a:r>
+            <a:r>
+              <a:rPr lang="de-DE" sz="1400" dirty="0"/>
+              <a:t> </a:t>
+            </a:r>
+            <a:r>
+              <a:rPr lang="de-DE" sz="1400" dirty="0" err="1"/>
+              <a:t>encrypt</a:t>
+            </a:r>
+            <a:r>
+              <a:rPr lang="de-DE" sz="1400" dirty="0"/>
+              <a:t> </a:t>
+            </a:r>
+            <a:r>
+              <a:rPr lang="de-DE" sz="1400" dirty="0" err="1"/>
+              <a:t>password</a:t>
+            </a:r>
+            <a:r>
+              <a:rPr lang="de-DE" sz="1400" dirty="0"/>
+              <a:t> and </a:t>
+            </a:r>
+            <a:r>
+              <a:rPr lang="de-DE" sz="1400" dirty="0" err="1"/>
+              <a:t>add</a:t>
+            </a:r>
+            <a:r>
+              <a:rPr lang="de-DE" sz="1400" dirty="0"/>
+              <a:t> </a:t>
+            </a:r>
+            <a:r>
+              <a:rPr lang="de-DE" sz="1400" dirty="0" err="1"/>
+              <a:t>token</a:t>
+            </a:r>
+            <a:r>
+              <a:rPr lang="de-DE" sz="1400" dirty="0"/>
+              <a:t> </a:t>
+            </a:r>
+            <a:r>
+              <a:rPr lang="de-DE" sz="1400" dirty="0" err="1"/>
+              <a:t>authorization</a:t>
+            </a:r>
+            <a:r>
+              <a:rPr lang="de-DE" sz="1400" dirty="0"/>
+              <a:t> </a:t>
+            </a:r>
+            <a:r>
+              <a:rPr lang="de-DE" sz="1400" dirty="0" err="1"/>
+              <a:t>for</a:t>
+            </a:r>
+            <a:r>
+              <a:rPr lang="de-DE" sz="1400" dirty="0"/>
+              <a:t> </a:t>
+            </a:r>
+            <a:r>
+              <a:rPr lang="de-DE" sz="1400" dirty="0" err="1"/>
+              <a:t>each</a:t>
+            </a:r>
+            <a:r>
+              <a:rPr lang="de-DE" sz="1400" dirty="0"/>
+              <a:t> route</a:t>
+            </a:r>
+          </a:p>
+          <a:p>
+            <a:pPr>
+              <a:buFont typeface="Arial" charset="0"/>
+              <a:buAutoNum type="arabicPeriod"/>
+            </a:pPr>
+            <a:r>
+              <a:rPr lang="de-DE" sz="1400" dirty="0" err="1"/>
+              <a:t>Used</a:t>
+            </a:r>
+            <a:r>
+              <a:rPr lang="de-DE" sz="1400" dirty="0"/>
+              <a:t>: </a:t>
+            </a:r>
+            <a:r>
+              <a:rPr lang="de-DE" sz="1400" dirty="0" err="1"/>
+              <a:t>jsonwebtoken</a:t>
+            </a:r>
+            <a:r>
+              <a:rPr lang="de-DE" sz="1400" dirty="0"/>
+              <a:t>, </a:t>
+            </a:r>
+            <a:r>
+              <a:rPr lang="de-DE" sz="1400" dirty="0" err="1"/>
+              <a:t>bcryptjs</a:t>
+            </a:r>
+            <a:r>
+              <a:rPr lang="de-DE" sz="1400" dirty="0"/>
+              <a:t> </a:t>
+            </a:r>
+            <a:r>
+              <a:rPr lang="de-DE" sz="1400" dirty="0" err="1"/>
+              <a:t>package</a:t>
+            </a:r>
+            <a:endParaRPr lang="de-DE" sz="1400" dirty="0"/>
+          </a:p>
+          <a:p>
+            <a:pPr marL="0" indent="0" algn="l">
+              <a:buNone/>
+            </a:pPr>
+            <a:endParaRPr lang="de-DE" sz="1400" dirty="0"/>
+          </a:p>
+          <a:p>
+            <a:pPr marL="0" indent="0" algn="l">
+              <a:buNone/>
+            </a:pPr>
+            <a:endParaRPr lang="de-DE" sz="1400" dirty="0"/>
+          </a:p>
+        </p:txBody>
+      </p:sp>
+      <p:sp>
+        <p:nvSpPr>
+          <p:cNvPr id="11" name="Datumsplatzhalter 10"/>
+          <p:cNvSpPr>
+            <a:spLocks noGrp="1"/>
+          </p:cNvSpPr>
+          <p:nvPr>
+            <p:ph type="dt" sz="half" idx="10"/>
+          </p:nvPr>
+        </p:nvSpPr>
         <p:spPr/>
+        <p:txBody>
+          <a:bodyPr/>
+          <a:lstStyle/>
+          <a:p>
+            <a:pPr>
+              <a:defRPr/>
+            </a:pPr>
+            <a:fld id="{D76B2423-297A-4B0D-AB43-E773970A055B}" type="datetime1">
+              <a:rPr lang="de-DE" smtClean="0"/>
+              <a:t>07.11.2021</a:t>
+            </a:fld>
+            <a:endParaRPr lang="de-DE" dirty="0"/>
+          </a:p>
+        </p:txBody>
+      </p:sp>
+      <p:sp>
+        <p:nvSpPr>
+          <p:cNvPr id="12" name="Foliennummernplatzhalter 11"/>
+          <p:cNvSpPr>
+            <a:spLocks noGrp="1"/>
+          </p:cNvSpPr>
+          <p:nvPr>
+            <p:ph type="sldNum" sz="quarter" idx="12"/>
+          </p:nvPr>
+        </p:nvSpPr>
+        <p:spPr/>
+        <p:txBody>
+          <a:bodyPr/>
+          <a:lstStyle/>
+          <a:p>
+            <a:pPr>
+              <a:defRPr/>
+            </a:pPr>
+            <a:fld id="{619C166B-5E38-4CD5-9E59-7E2FFEC9FB68}" type="slidenum">
+              <a:rPr lang="de-DE" smtClean="0"/>
+              <a:pPr>
+                <a:defRPr/>
+              </a:pPr>
+              <a:t>2</a:t>
+            </a:fld>
+            <a:endParaRPr lang="de-DE"/>
+          </a:p>
+        </p:txBody>
+      </p:sp>
+    </p:spTree>
+    <p:extLst>
+      <p:ext uri="{BB962C8B-B14F-4D97-AF65-F5344CB8AC3E}">
+        <p14:creationId xmlns:p14="http://schemas.microsoft.com/office/powerpoint/2010/main" val="248669613"/>
+      </p:ext>
+    </p:extLst>
+  </p:cSld>
+  <p:clrMapOvr>
+    <a:masterClrMapping/>
+  </p:clrMapOvr>
+</p:sld>
+</file>
+
+<file path=ppt/slides/slide3.xml><?xml version="1.0" encoding="utf-8"?>
+<p:sld xmlns:a="http://schemas.openxmlformats.org/drawingml/2006/main" xmlns:r="http://schemas.openxmlformats.org/officeDocument/2006/relationships" xmlns:p="http://schemas.openxmlformats.org/presentationml/2006/main">
+  <p:cSld>
+    <p:spTree>
+      <p:nvGrpSpPr>
+        <p:cNvPr id="1" name=""/>
+        <p:cNvGrpSpPr/>
+        <p:nvPr/>
+      </p:nvGrpSpPr>
+      <p:grpSpPr>
+        <a:xfrm>
+          <a:off x="0" y="0"/>
+          <a:ext cx="0" cy="0"/>
+          <a:chOff x="0" y="0"/>
+          <a:chExt cx="0" cy="0"/>
+        </a:xfrm>
+      </p:grpSpPr>
+      <p:sp>
+        <p:nvSpPr>
+          <p:cNvPr id="4" name="Titel 3"/>
+          <p:cNvSpPr>
+            <a:spLocks noGrp="1"/>
+          </p:cNvSpPr>
+          <p:nvPr>
+            <p:ph type="title"/>
+          </p:nvPr>
+        </p:nvSpPr>
+        <p:spPr>
+          <a:xfrm>
+            <a:off x="457200" y="206375"/>
+            <a:ext cx="5842992" cy="565150"/>
+          </a:xfrm>
+        </p:spPr>
+        <p:txBody>
+          <a:bodyPr/>
+          <a:lstStyle/>
+          <a:p>
+            <a:r>
+              <a:rPr lang="en-GB" sz="2000" b="1" dirty="0"/>
+              <a:t>Setup the demo</a:t>
+            </a:r>
+            <a:endParaRPr lang="de-DE" sz="2000" dirty="0"/>
+          </a:p>
+        </p:txBody>
+      </p:sp>
+      <p:sp>
+        <p:nvSpPr>
+          <p:cNvPr id="2" name="Inhaltsplatzhalter 1"/>
+          <p:cNvSpPr>
+            <a:spLocks noGrp="1"/>
+          </p:cNvSpPr>
+          <p:nvPr>
+            <p:ph idx="1"/>
+          </p:nvPr>
+        </p:nvSpPr>
+        <p:spPr>
+          <a:xfrm>
+            <a:off x="457200" y="987574"/>
+            <a:ext cx="8229600" cy="3606651"/>
+          </a:xfrm>
+        </p:spPr>
         <p:txBody>
           <a:bodyPr/>
           <a:lstStyle/>
@@ -4814,7 +5797,7 @@
                 </a:solidFill>
                 <a:latin typeface="Calibri" panose="020F0502020204030204" pitchFamily="34" charset="0"/>
               </a:rPr>
-              <a:t> MySQL database.</a:t>
+              <a:t> MySQL database</a:t>
             </a:r>
           </a:p>
           <a:p>
@@ -4880,17 +5863,14 @@
                 </a:solidFill>
                 <a:latin typeface="Calibri" panose="020F0502020204030204" pitchFamily="34" charset="0"/>
               </a:rPr>
-              <a:t> for development ( it will install express, body-parser and </a:t>
-            </a:r>
-            <a:r>
-              <a:rPr lang="en-GB" sz="1400" b="0" i="0" u="none" strike="noStrike" baseline="0" dirty="0" err="1">
-                <a:solidFill>
-                  <a:srgbClr val="000000"/>
-                </a:solidFill>
-                <a:latin typeface="Calibri" panose="020F0502020204030204" pitchFamily="34" charset="0"/>
-              </a:rPr>
-              <a:t>mysql</a:t>
-            </a:r>
+              <a:t> for development</a:t>
+            </a:r>
+          </a:p>
+          <a:p>
+            <a:pPr marL="342900" indent="-342900" algn="l">
+              <a:buFont typeface="+mj-lt"/>
+              <a:buAutoNum type="arabicPeriod"/>
+            </a:pPr>
             <a:r>
               <a:rPr lang="en-GB" sz="1400" b="0" i="0" u="none" strike="noStrike" baseline="0" dirty="0">
                 <a:solidFill>
@@ -4898,22 +5878,7 @@
                 </a:solidFill>
                 <a:latin typeface="Calibri" panose="020F0502020204030204" pitchFamily="34" charset="0"/>
               </a:rPr>
-              <a:t> packages)</a:t>
-            </a:r>
-          </a:p>
-          <a:p>
-            <a:pPr marL="342900" indent="-342900" algn="l">
-              <a:buFont typeface="+mj-lt"/>
-              <a:buAutoNum type="arabicPeriod"/>
-            </a:pPr>
-            <a:r>
-              <a:rPr lang="en-GB" sz="1400" b="0" i="0" u="none" strike="noStrike" baseline="0" dirty="0">
-                <a:solidFill>
-                  <a:srgbClr val="000000"/>
-                </a:solidFill>
-                <a:latin typeface="Calibri" panose="020F0502020204030204" pitchFamily="34" charset="0"/>
-              </a:rPr>
-              <a:t>start the MySQL using MySQL Workbench and create the database table with query provided</a:t>
+              <a:t>start the MySQL using MySQL Workbench and create the two databases table with query provided</a:t>
             </a:r>
           </a:p>
           <a:p>
@@ -4961,7 +5926,7 @@
                 </a:solidFill>
                 <a:latin typeface="Calibri" panose="020F0502020204030204" pitchFamily="34" charset="0"/>
               </a:rPr>
-              <a:t>Write code to create web server, include middleware for body-parser and custom routes in App.js.</a:t>
+              <a:t>Write code to create web server, include middleware for body-parser and routes in App.js</a:t>
             </a:r>
           </a:p>
           <a:p>
@@ -4976,8 +5941,65 @@
                 </a:solidFill>
                 <a:latin typeface="Calibri" panose="020F0502020204030204" pitchFamily="34" charset="0"/>
               </a:rPr>
-              <a:t>Write code to user-routes.js to add API endpoints for PUT, GET, PATCH and DELETE.</a:t>
-            </a:r>
+              <a:t>Write code to user-routes.js to add API endpoints for PUT, GET, PATCH and DELETE</a:t>
+            </a:r>
+            <a:r>
+              <a:rPr lang="en-GB" sz="1400" dirty="0">
+                <a:solidFill>
+                  <a:srgbClr val="000000"/>
+                </a:solidFill>
+                <a:latin typeface="Calibri" panose="020F0502020204030204" pitchFamily="34" charset="0"/>
+              </a:rPr>
+              <a:t> and controller code</a:t>
+            </a:r>
+            <a:endParaRPr lang="en-GB" sz="1400" b="0" i="0" u="none" strike="noStrike" baseline="0" dirty="0">
+              <a:solidFill>
+                <a:srgbClr val="000000"/>
+              </a:solidFill>
+              <a:latin typeface="Calibri" panose="020F0502020204030204" pitchFamily="34" charset="0"/>
+            </a:endParaRPr>
+          </a:p>
+          <a:p>
+            <a:pPr marL="342900" indent="-342900" algn="l">
+              <a:buFont typeface="+mj-lt"/>
+              <a:buAutoNum type="arabicPeriod"/>
+            </a:pPr>
+            <a:r>
+              <a:rPr lang="en-GB" sz="1400" dirty="0">
+                <a:solidFill>
+                  <a:srgbClr val="000000"/>
+                </a:solidFill>
+                <a:latin typeface="Calibri" panose="020F0502020204030204" pitchFamily="34" charset="0"/>
+              </a:rPr>
+              <a:t>Write code to handle register and login with encryption and token generation</a:t>
+            </a:r>
+            <a:endParaRPr lang="en-GB" sz="1400" b="0" i="0" u="none" strike="noStrike" baseline="0" dirty="0">
+              <a:solidFill>
+                <a:srgbClr val="000000"/>
+              </a:solidFill>
+              <a:latin typeface="Calibri" panose="020F0502020204030204" pitchFamily="34" charset="0"/>
+            </a:endParaRPr>
+          </a:p>
+          <a:p>
+            <a:pPr marL="342900" indent="-342900" algn="l">
+              <a:buFont typeface="+mj-lt"/>
+              <a:buAutoNum type="arabicPeriod"/>
+            </a:pPr>
+            <a:r>
+              <a:rPr lang="en-GB" sz="1400" dirty="0">
+                <a:solidFill>
+                  <a:srgbClr val="000000"/>
+                </a:solidFill>
+                <a:latin typeface="Calibri" panose="020F0502020204030204" pitchFamily="34" charset="0"/>
+              </a:rPr>
+              <a:t>Write code for authentication middleware and include it for existing routes</a:t>
+            </a:r>
+            <a:endParaRPr lang="en-GB" sz="1400" b="0" i="0" u="none" strike="noStrike" baseline="0" dirty="0">
+              <a:solidFill>
+                <a:srgbClr val="000000"/>
+              </a:solidFill>
+              <a:latin typeface="Calibri" panose="020F0502020204030204" pitchFamily="34" charset="0"/>
+            </a:endParaRPr>
           </a:p>
           <a:p>
             <a:pPr marL="342900" indent="-342900">
@@ -5033,20 +6055,154 @@
                 </a:solidFill>
                 <a:latin typeface="Calibri" panose="020F0502020204030204" pitchFamily="34" charset="0"/>
               </a:rPr>
-              <a:t>check API functionality using tools like Postman or Insomnia.</a:t>
+              <a:t>check API functionality using tools like Postman or Insomnia</a:t>
             </a:r>
             <a:endParaRPr lang="en-US" sz="1400" dirty="0"/>
           </a:p>
           <a:p>
+            <a:pPr marL="457200" lvl="1" indent="0">
+              <a:buNone/>
+            </a:pPr>
+            <a:endParaRPr lang="de-DE" sz="1400" dirty="0"/>
+          </a:p>
+        </p:txBody>
+      </p:sp>
+      <p:sp>
+        <p:nvSpPr>
+          <p:cNvPr id="11" name="Datumsplatzhalter 10"/>
+          <p:cNvSpPr>
+            <a:spLocks noGrp="1"/>
+          </p:cNvSpPr>
+          <p:nvPr>
+            <p:ph type="dt" sz="half" idx="10"/>
+          </p:nvPr>
+        </p:nvSpPr>
+        <p:spPr/>
+        <p:txBody>
+          <a:bodyPr/>
+          <a:lstStyle/>
+          <a:p>
             <a:pPr>
-              <a:buFont typeface="Wingdings" panose="05000000000000000000" pitchFamily="2" charset="2"/>
-              <a:buChar char="Ø"/>
-            </a:pPr>
-            <a:r>
-              <a:rPr lang="de-DE" sz="1400" dirty="0"/>
-              <a:t>Resources on slides</a:t>
-            </a:r>
-          </a:p>
+              <a:defRPr/>
+            </a:pPr>
+            <a:fld id="{D76B2423-297A-4B0D-AB43-E773970A055B}" type="datetime1">
+              <a:rPr lang="de-DE" smtClean="0"/>
+              <a:t>07.11.2021</a:t>
+            </a:fld>
+            <a:endParaRPr lang="de-DE" dirty="0"/>
+          </a:p>
+        </p:txBody>
+      </p:sp>
+      <p:sp>
+        <p:nvSpPr>
+          <p:cNvPr id="12" name="Foliennummernplatzhalter 11"/>
+          <p:cNvSpPr>
+            <a:spLocks noGrp="1"/>
+          </p:cNvSpPr>
+          <p:nvPr>
+            <p:ph type="sldNum" sz="quarter" idx="12"/>
+          </p:nvPr>
+        </p:nvSpPr>
+        <p:spPr/>
+        <p:txBody>
+          <a:bodyPr/>
+          <a:lstStyle/>
+          <a:p>
+            <a:pPr>
+              <a:defRPr/>
+            </a:pPr>
+            <a:fld id="{619C166B-5E38-4CD5-9E59-7E2FFEC9FB68}" type="slidenum">
+              <a:rPr lang="de-DE" smtClean="0"/>
+              <a:pPr>
+                <a:defRPr/>
+              </a:pPr>
+              <a:t>3</a:t>
+            </a:fld>
+            <a:endParaRPr lang="de-DE"/>
+          </a:p>
+        </p:txBody>
+      </p:sp>
+    </p:spTree>
+    <p:extLst>
+      <p:ext uri="{BB962C8B-B14F-4D97-AF65-F5344CB8AC3E}">
+        <p14:creationId xmlns:p14="http://schemas.microsoft.com/office/powerpoint/2010/main" val="1660340240"/>
+      </p:ext>
+    </p:extLst>
+  </p:cSld>
+  <p:clrMapOvr>
+    <a:masterClrMapping/>
+  </p:clrMapOvr>
+</p:sld>
+</file>
+
+<file path=ppt/slides/slide4.xml><?xml version="1.0" encoding="utf-8"?>
+<p:sld xmlns:a="http://schemas.openxmlformats.org/drawingml/2006/main" xmlns:r="http://schemas.openxmlformats.org/officeDocument/2006/relationships" xmlns:p="http://schemas.openxmlformats.org/presentationml/2006/main">
+  <p:cSld>
+    <p:spTree>
+      <p:nvGrpSpPr>
+        <p:cNvPr id="1" name=""/>
+        <p:cNvGrpSpPr/>
+        <p:nvPr/>
+      </p:nvGrpSpPr>
+      <p:grpSpPr>
+        <a:xfrm>
+          <a:off x="0" y="0"/>
+          <a:ext cx="0" cy="0"/>
+          <a:chOff x="0" y="0"/>
+          <a:chExt cx="0" cy="0"/>
+        </a:xfrm>
+      </p:grpSpPr>
+      <p:sp>
+        <p:nvSpPr>
+          <p:cNvPr id="4" name="Titel 3"/>
+          <p:cNvSpPr>
+            <a:spLocks noGrp="1"/>
+          </p:cNvSpPr>
+          <p:nvPr>
+            <p:ph type="title"/>
+          </p:nvPr>
+        </p:nvSpPr>
+        <p:spPr>
+          <a:xfrm>
+            <a:off x="457200" y="206375"/>
+            <a:ext cx="5842992" cy="565150"/>
+          </a:xfrm>
+        </p:spPr>
+        <p:txBody>
+          <a:bodyPr/>
+          <a:lstStyle/>
+          <a:p>
+            <a:r>
+              <a:rPr lang="en-GB" sz="2000" dirty="0"/>
+              <a:t>D</a:t>
+            </a:r>
+            <a:r>
+              <a:rPr lang="en-GB" sz="2000" b="1" dirty="0"/>
+              <a:t>emo Resources </a:t>
+            </a:r>
+            <a:endParaRPr lang="de-DE" sz="2000" dirty="0"/>
+          </a:p>
+        </p:txBody>
+      </p:sp>
+      <p:sp>
+        <p:nvSpPr>
+          <p:cNvPr id="2" name="Inhaltsplatzhalter 1"/>
+          <p:cNvSpPr>
+            <a:spLocks noGrp="1"/>
+          </p:cNvSpPr>
+          <p:nvPr>
+            <p:ph idx="1"/>
+          </p:nvPr>
+        </p:nvSpPr>
+        <p:spPr>
+          <a:xfrm>
+            <a:off x="457200" y="987574"/>
+            <a:ext cx="8229600" cy="3606651"/>
+          </a:xfrm>
+        </p:spPr>
+        <p:txBody>
+          <a:bodyPr/>
+          <a:lstStyle/>
           <a:p>
             <a:pPr lvl="1">
               <a:buFont typeface="Wingdings" panose="05000000000000000000" pitchFamily="2" charset="2"/>
@@ -5087,15 +6243,103 @@
           </a:p>
           <a:p>
             <a:pPr lvl="1">
-              <a:buBlip>
-                <a:blip r:embed="rId4">
+              <a:buFont typeface="Wingdings" panose="05000000000000000000" pitchFamily="2" charset="2"/>
+              <a:buChar char="Ø"/>
+            </a:pPr>
+            <a:r>
+              <a:rPr lang="de-DE" sz="1400" dirty="0"/>
+              <a:t>https://www.npmjs.com/package/body-parser</a:t>
+            </a:r>
+          </a:p>
+          <a:p>
+            <a:pPr lvl="1">
+              <a:buFont typeface="Wingdings" panose="05000000000000000000" pitchFamily="2" charset="2"/>
+              <a:buChar char="Ø"/>
+            </a:pPr>
+            <a:r>
+              <a:rPr lang="de-DE" sz="1400" dirty="0">
+                <a:hlinkClick r:id="rId4">
                   <a:extLst>
-                    <a:ext uri="{837473B0-CC2E-450A-ABE3-18F120FF3D39}">
-                      <a1611:picAttrSrcUrl xmlns:a1611="http://schemas.microsoft.com/office/drawing/2016/11/main" r:id="rId5"/>
+                    <a:ext uri="{A12FA001-AC4F-418D-AE19-62706E023703}">
+                      <ahyp:hlinkClr xmlns:ahyp="http://schemas.microsoft.com/office/drawing/2018/hyperlinkcolor" val="tx"/>
                     </a:ext>
                   </a:extLst>
-                </a:blip>
-              </a:buBlip>
+                </a:hlinkClick>
+              </a:rPr>
+              <a:t>https://expressjs.com/</a:t>
+            </a:r>
+            <a:endParaRPr lang="de-DE" sz="1400" dirty="0"/>
+          </a:p>
+          <a:p>
+            <a:pPr lvl="1">
+              <a:buFont typeface="Wingdings" panose="05000000000000000000" pitchFamily="2" charset="2"/>
+              <a:buChar char="Ø"/>
+            </a:pPr>
+            <a:r>
+              <a:rPr lang="de-DE" sz="1400" dirty="0">
+                <a:hlinkClick r:id="rId5">
+                  <a:extLst>
+                    <a:ext uri="{A12FA001-AC4F-418D-AE19-62706E023703}">
+                      <ahyp:hlinkClr xmlns:ahyp="http://schemas.microsoft.com/office/drawing/2018/hyperlinkcolor" val="tx"/>
+                    </a:ext>
+                  </a:extLst>
+                </a:hlinkClick>
+              </a:rPr>
+              <a:t>https://www.npmjs.com/package/bcryptjs</a:t>
+            </a:r>
+            <a:endParaRPr lang="de-DE" sz="1400" dirty="0"/>
+          </a:p>
+          <a:p>
+            <a:pPr lvl="1">
+              <a:buFont typeface="Wingdings" panose="05000000000000000000" pitchFamily="2" charset="2"/>
+              <a:buChar char="Ø"/>
+            </a:pPr>
+            <a:r>
+              <a:rPr lang="de-DE" sz="1400" dirty="0">
+                <a:hlinkClick r:id="rId6">
+                  <a:extLst>
+                    <a:ext uri="{A12FA001-AC4F-418D-AE19-62706E023703}">
+                      <ahyp:hlinkClr xmlns:ahyp="http://schemas.microsoft.com/office/drawing/2018/hyperlinkcolor" val="tx"/>
+                    </a:ext>
+                  </a:extLst>
+                </a:hlinkClick>
+              </a:rPr>
+              <a:t>https://www.npmjs.com/package/jsonwebtoken</a:t>
+            </a:r>
+            <a:endParaRPr lang="de-DE" sz="1400" dirty="0"/>
+          </a:p>
+          <a:p>
+            <a:pPr lvl="1">
+              <a:buFont typeface="Wingdings" panose="05000000000000000000" pitchFamily="2" charset="2"/>
+              <a:buChar char="Ø"/>
+            </a:pPr>
+            <a:r>
+              <a:rPr lang="de-DE" sz="1400" dirty="0">
+                <a:hlinkClick r:id="rId7">
+                  <a:extLst>
+                    <a:ext uri="{A12FA001-AC4F-418D-AE19-62706E023703}">
+                      <ahyp:hlinkClr xmlns:ahyp="http://schemas.microsoft.com/office/drawing/2018/hyperlinkcolor" val="tx"/>
+                    </a:ext>
+                  </a:extLst>
+                </a:hlinkClick>
+              </a:rPr>
+              <a:t>https://expressjs.com/en/5x/api.html</a:t>
+            </a:r>
+            <a:endParaRPr lang="de-DE" sz="1400" dirty="0"/>
+          </a:p>
+          <a:p>
+            <a:pPr lvl="1">
+              <a:buFont typeface="Wingdings" panose="05000000000000000000" pitchFamily="2" charset="2"/>
+              <a:buChar char="Ø"/>
+            </a:pPr>
+            <a:r>
+              <a:rPr lang="de-DE" sz="1400" dirty="0"/>
+              <a:t>https://nodejs.org/en/docs/guides/</a:t>
+            </a:r>
+          </a:p>
+          <a:p>
+            <a:pPr marL="457200" lvl="1" indent="0">
+              <a:buNone/>
             </a:pPr>
             <a:endParaRPr lang="de-DE" sz="1400" dirty="0"/>
           </a:p>
@@ -5121,7 +6365,7 @@
             </a:pPr>
             <a:fld id="{D76B2423-297A-4B0D-AB43-E773970A055B}" type="datetime1">
               <a:rPr lang="de-DE" smtClean="0"/>
-              <a:t>04.11.2021</a:t>
+              <a:t>07.11.2021</a:t>
             </a:fld>
             <a:endParaRPr lang="de-DE" dirty="0"/>
           </a:p>
@@ -5150,7 +6394,7 @@
               <a:pPr>
                 <a:defRPr/>
               </a:pPr>
-              <a:t>2</a:t>
+              <a:t>4</a:t>
             </a:fld>
             <a:endParaRPr lang="de-DE"/>
           </a:p>
@@ -5159,7 +6403,7 @@
     </p:spTree>
     <p:extLst>
       <p:ext uri="{BB962C8B-B14F-4D97-AF65-F5344CB8AC3E}">
-        <p14:creationId xmlns:p14="http://schemas.microsoft.com/office/powerpoint/2010/main" val="1220989824"/>
+        <p14:creationId xmlns:p14="http://schemas.microsoft.com/office/powerpoint/2010/main" val="2759257066"/>
       </p:ext>
     </p:extLst>
   </p:cSld>

</xml_diff>